<commit_message>
updated installation overview images
</commit_message>
<xml_diff>
--- a/docs/EquipmentSetup/CloudExplained/CloudExplained.pptx
+++ b/docs/EquipmentSetup/CloudExplained/CloudExplained.pptx
@@ -274,7 +274,7 @@
           <a:p>
             <a:fld id="{DFF2FBC3-E573-4B2D-B1C4-960EEBA08826}" type="datetimeFigureOut">
               <a:rPr lang="fr-CA" smtClean="0"/>
-              <a:t>2024-01-10</a:t>
+              <a:t>2024-01-15</a:t>
             </a:fld>
             <a:endParaRPr lang="fr-CA"/>
           </a:p>
@@ -474,7 +474,7 @@
           <a:p>
             <a:fld id="{DFF2FBC3-E573-4B2D-B1C4-960EEBA08826}" type="datetimeFigureOut">
               <a:rPr lang="fr-CA" smtClean="0"/>
-              <a:t>2024-01-10</a:t>
+              <a:t>2024-01-15</a:t>
             </a:fld>
             <a:endParaRPr lang="fr-CA"/>
           </a:p>
@@ -684,7 +684,7 @@
           <a:p>
             <a:fld id="{DFF2FBC3-E573-4B2D-B1C4-960EEBA08826}" type="datetimeFigureOut">
               <a:rPr lang="fr-CA" smtClean="0"/>
-              <a:t>2024-01-10</a:t>
+              <a:t>2024-01-15</a:t>
             </a:fld>
             <a:endParaRPr lang="fr-CA"/>
           </a:p>
@@ -884,7 +884,7 @@
           <a:p>
             <a:fld id="{DFF2FBC3-E573-4B2D-B1C4-960EEBA08826}" type="datetimeFigureOut">
               <a:rPr lang="fr-CA" smtClean="0"/>
-              <a:t>2024-01-10</a:t>
+              <a:t>2024-01-15</a:t>
             </a:fld>
             <a:endParaRPr lang="fr-CA"/>
           </a:p>
@@ -1160,7 +1160,7 @@
           <a:p>
             <a:fld id="{DFF2FBC3-E573-4B2D-B1C4-960EEBA08826}" type="datetimeFigureOut">
               <a:rPr lang="fr-CA" smtClean="0"/>
-              <a:t>2024-01-10</a:t>
+              <a:t>2024-01-15</a:t>
             </a:fld>
             <a:endParaRPr lang="fr-CA"/>
           </a:p>
@@ -1428,7 +1428,7 @@
           <a:p>
             <a:fld id="{DFF2FBC3-E573-4B2D-B1C4-960EEBA08826}" type="datetimeFigureOut">
               <a:rPr lang="fr-CA" smtClean="0"/>
-              <a:t>2024-01-10</a:t>
+              <a:t>2024-01-15</a:t>
             </a:fld>
             <a:endParaRPr lang="fr-CA"/>
           </a:p>
@@ -1843,7 +1843,7 @@
           <a:p>
             <a:fld id="{DFF2FBC3-E573-4B2D-B1C4-960EEBA08826}" type="datetimeFigureOut">
               <a:rPr lang="fr-CA" smtClean="0"/>
-              <a:t>2024-01-10</a:t>
+              <a:t>2024-01-15</a:t>
             </a:fld>
             <a:endParaRPr lang="fr-CA"/>
           </a:p>
@@ -1985,7 +1985,7 @@
           <a:p>
             <a:fld id="{DFF2FBC3-E573-4B2D-B1C4-960EEBA08826}" type="datetimeFigureOut">
               <a:rPr lang="fr-CA" smtClean="0"/>
-              <a:t>2024-01-10</a:t>
+              <a:t>2024-01-15</a:t>
             </a:fld>
             <a:endParaRPr lang="fr-CA"/>
           </a:p>
@@ -2098,7 +2098,7 @@
           <a:p>
             <a:fld id="{DFF2FBC3-E573-4B2D-B1C4-960EEBA08826}" type="datetimeFigureOut">
               <a:rPr lang="fr-CA" smtClean="0"/>
-              <a:t>2024-01-10</a:t>
+              <a:t>2024-01-15</a:t>
             </a:fld>
             <a:endParaRPr lang="fr-CA"/>
           </a:p>
@@ -2411,7 +2411,7 @@
           <a:p>
             <a:fld id="{DFF2FBC3-E573-4B2D-B1C4-960EEBA08826}" type="datetimeFigureOut">
               <a:rPr lang="fr-CA" smtClean="0"/>
-              <a:t>2024-01-10</a:t>
+              <a:t>2024-01-15</a:t>
             </a:fld>
             <a:endParaRPr lang="fr-CA"/>
           </a:p>
@@ -2700,7 +2700,7 @@
           <a:p>
             <a:fld id="{DFF2FBC3-E573-4B2D-B1C4-960EEBA08826}" type="datetimeFigureOut">
               <a:rPr lang="fr-CA" smtClean="0"/>
-              <a:t>2024-01-10</a:t>
+              <a:t>2024-01-15</a:t>
             </a:fld>
             <a:endParaRPr lang="fr-CA"/>
           </a:p>
@@ -2943,7 +2943,7 @@
           <a:p>
             <a:fld id="{DFF2FBC3-E573-4B2D-B1C4-960EEBA08826}" type="datetimeFigureOut">
               <a:rPr lang="fr-CA" smtClean="0"/>
-              <a:t>2024-01-10</a:t>
+              <a:t>2024-01-15</a:t>
             </a:fld>
             <a:endParaRPr lang="fr-CA"/>
           </a:p>
@@ -7176,8 +7176,8 @@
         </p:nvSpPr>
         <p:spPr>
           <a:xfrm>
-            <a:off x="6406713" y="4309012"/>
-            <a:ext cx="1377493" cy="369332"/>
+            <a:off x="6329079" y="4309012"/>
+            <a:ext cx="1972207" cy="369332"/>
           </a:xfrm>
           <a:prstGeom prst="rect">
             <a:avLst/>
@@ -7191,10 +7191,9 @@
           <a:lstStyle/>
           <a:p>
             <a:r>
-              <a:rPr lang="fr-CA" dirty="0" err="1"/>
-              <a:t>publicresults</a:t>
-            </a:r>
-            <a:endParaRPr lang="fr-CA" dirty="0"/>
+              <a:rPr lang="fr-CA" dirty="0"/>
+              <a:t>Cloud publicresults</a:t>
+            </a:r>
           </a:p>
         </p:txBody>
       </p:sp>
@@ -7294,8 +7293,8 @@
         </p:nvSpPr>
         <p:spPr>
           <a:xfrm>
-            <a:off x="7015445" y="1652200"/>
-            <a:ext cx="840295" cy="430887"/>
+            <a:off x="7029872" y="1652200"/>
+            <a:ext cx="811440" cy="577081"/>
           </a:xfrm>
           <a:prstGeom prst="rect">
             <a:avLst/>
@@ -7312,6 +7311,17 @@
             <a:r>
               <a:rPr lang="fr-CA" sz="1050" dirty="0"/>
               <a:t>Internet</a:t>
+            </a:r>
+            <a:br>
+              <a:rPr lang="fr-CA" sz="1050" dirty="0"/>
+            </a:br>
+            <a:r>
+              <a:rPr lang="fr-CA" sz="1050" dirty="0" err="1"/>
+              <a:t>access</a:t>
+            </a:r>
+            <a:r>
+              <a:rPr lang="fr-CA" sz="1050" dirty="0"/>
+              <a:t> to</a:t>
             </a:r>
             <a:br>
               <a:rPr lang="fr-CA" sz="1050" dirty="0"/>

</xml_diff>